<commit_message>
Make templates use more universal font name (Arial), demonstrate run-within-paragraph formatting in sample_doc
</commit_message>
<xml_diff>
--- a/src/manuscript2slides/resources/pptx_template.pptx
+++ b/src/manuscript2slides/resources/pptx_template.pptx
@@ -197,7 +197,7 @@
           <a:p>
             <a:fld id="{21F925AA-DF56-4E9B-BD17-5F928015F194}" type="datetimeFigureOut">
               <a:rPr lang="en-US" smtClean="0"/>
-              <a:t>10/10/2025</a:t>
+              <a:t>11/11/2025</a:t>
             </a:fld>
             <a:endParaRPr lang="en-US"/>
           </a:p>
@@ -375,7 +375,7 @@
         <a:solidFill>
           <a:schemeClr val="tx1"/>
         </a:solidFill>
-        <a:latin typeface="Times New Roman" panose="02020603050405020304" pitchFamily="18" charset="0"/>
+        <a:latin typeface="+mj-lt"/>
         <a:ea typeface="+mn-ea"/>
         <a:cs typeface="Times New Roman" panose="02020603050405020304" pitchFamily="18" charset="0"/>
       </a:defRPr>
@@ -385,7 +385,7 @@
         <a:solidFill>
           <a:schemeClr val="tx1"/>
         </a:solidFill>
-        <a:latin typeface="Times New Roman" panose="02020603050405020304" pitchFamily="18" charset="0"/>
+        <a:latin typeface="+mj-lt"/>
         <a:ea typeface="+mn-ea"/>
         <a:cs typeface="Times New Roman" panose="02020603050405020304" pitchFamily="18" charset="0"/>
       </a:defRPr>
@@ -395,7 +395,7 @@
         <a:solidFill>
           <a:schemeClr val="tx1"/>
         </a:solidFill>
-        <a:latin typeface="Times New Roman" panose="02020603050405020304" pitchFamily="18" charset="0"/>
+        <a:latin typeface="+mj-lt"/>
         <a:ea typeface="+mn-ea"/>
         <a:cs typeface="Times New Roman" panose="02020603050405020304" pitchFamily="18" charset="0"/>
       </a:defRPr>
@@ -405,7 +405,7 @@
         <a:solidFill>
           <a:schemeClr val="tx1"/>
         </a:solidFill>
-        <a:latin typeface="Times New Roman" panose="02020603050405020304" pitchFamily="18" charset="0"/>
+        <a:latin typeface="+mj-lt"/>
         <a:ea typeface="+mn-ea"/>
         <a:cs typeface="Times New Roman" panose="02020603050405020304" pitchFamily="18" charset="0"/>
       </a:defRPr>
@@ -415,7 +415,7 @@
         <a:solidFill>
           <a:schemeClr val="tx1"/>
         </a:solidFill>
-        <a:latin typeface="Times New Roman" panose="02020603050405020304" pitchFamily="18" charset="0"/>
+        <a:latin typeface="+mj-lt"/>
         <a:ea typeface="+mn-ea"/>
         <a:cs typeface="Times New Roman" panose="02020603050405020304" pitchFamily="18" charset="0"/>
       </a:defRPr>
@@ -504,7 +504,7 @@
           <a:p>
             <a:fld id="{4AF78ED4-71B5-4E4D-9C52-9D18387CE0A0}" type="datetimeFigureOut">
               <a:rPr lang="en-US" smtClean="0"/>
-              <a:t>10/10/2025</a:t>
+              <a:t>11/11/2025</a:t>
             </a:fld>
             <a:endParaRPr lang="en-US"/>
           </a:p>
@@ -597,7 +597,7 @@
               </a:lnSpc>
               <a:buNone/>
               <a:defRPr sz="1800">
-                <a:latin typeface="Bookerly" panose="02020602040305020204" pitchFamily="18" charset="0"/>
+                <a:latin typeface="+mj-lt"/>
                 <a:ea typeface="Bookerly" panose="02020602040305020204" pitchFamily="18" charset="0"/>
                 <a:cs typeface="Bookerly" panose="02020602040305020204" pitchFamily="18" charset="0"/>
               </a:defRPr>
@@ -793,7 +793,7 @@
           <a:p>
             <a:fld id="{4AF78ED4-71B5-4E4D-9C52-9D18387CE0A0}" type="datetimeFigureOut">
               <a:rPr lang="en-US" smtClean="0"/>
-              <a:t>10/10/2025</a:t>
+              <a:t>11/11/2025</a:t>
             </a:fld>
             <a:endParaRPr lang="en-US"/>
           </a:p>
@@ -1224,16 +1224,76 @@
         <a:srgbClr val="954F72"/>
       </a:folHlink>
     </a:clrScheme>
-    <a:fontScheme name="Custom 1">
+    <a:fontScheme name="Arial">
       <a:majorFont>
-        <a:latin typeface="Bookerly"/>
+        <a:latin typeface="Arial" panose="020B0604020202020204"/>
         <a:ea typeface=""/>
         <a:cs typeface=""/>
+        <a:font script="Jpan" typeface="ＭＳ Ｐゴシック"/>
+        <a:font script="Hang" typeface="굴림"/>
+        <a:font script="Hans" typeface="黑体"/>
+        <a:font script="Hant" typeface="微軟正黑體"/>
+        <a:font script="Arab" typeface="Arial"/>
+        <a:font script="Hebr" typeface="Arial"/>
+        <a:font script="Thai" typeface="Cordia New"/>
+        <a:font script="Ethi" typeface="Nyala"/>
+        <a:font script="Beng" typeface="Vrinda"/>
+        <a:font script="Gujr" typeface="Shruti"/>
+        <a:font script="Khmr" typeface="DaunPenh"/>
+        <a:font script="Knda" typeface="Tunga"/>
+        <a:font script="Guru" typeface="Raavi"/>
+        <a:font script="Cans" typeface="Euphemia"/>
+        <a:font script="Cher" typeface="Plantagenet Cherokee"/>
+        <a:font script="Yiii" typeface="Microsoft Yi Baiti"/>
+        <a:font script="Tibt" typeface="Microsoft Himalaya"/>
+        <a:font script="Thaa" typeface="MV Boli"/>
+        <a:font script="Deva" typeface="Mangal"/>
+        <a:font script="Telu" typeface="Gautami"/>
+        <a:font script="Taml" typeface="Latha"/>
+        <a:font script="Syrc" typeface="Estrangelo Edessa"/>
+        <a:font script="Orya" typeface="Kalinga"/>
+        <a:font script="Mlym" typeface="Kartika"/>
+        <a:font script="Laoo" typeface="DokChampa"/>
+        <a:font script="Sinh" typeface="Iskoola Pota"/>
+        <a:font script="Mong" typeface="Mongolian Baiti"/>
+        <a:font script="Viet" typeface="Arial"/>
+        <a:font script="Uigh" typeface="Microsoft Uighur"/>
+        <a:font script="Geor" typeface="Sylfaen"/>
       </a:majorFont>
       <a:minorFont>
-        <a:latin typeface="Bookerly"/>
+        <a:latin typeface="Arial" panose="020B0604020202020204"/>
         <a:ea typeface=""/>
         <a:cs typeface=""/>
+        <a:font script="Jpan" typeface="ＭＳ Ｐゴシック"/>
+        <a:font script="Hang" typeface="굴림"/>
+        <a:font script="Hans" typeface="黑体"/>
+        <a:font script="Hant" typeface="微軟正黑體"/>
+        <a:font script="Arab" typeface="Arial"/>
+        <a:font script="Hebr" typeface="Arial"/>
+        <a:font script="Thai" typeface="Cordia New"/>
+        <a:font script="Ethi" typeface="Nyala"/>
+        <a:font script="Beng" typeface="Vrinda"/>
+        <a:font script="Gujr" typeface="Shruti"/>
+        <a:font script="Khmr" typeface="DaunPenh"/>
+        <a:font script="Knda" typeface="Tunga"/>
+        <a:font script="Guru" typeface="Raavi"/>
+        <a:font script="Cans" typeface="Euphemia"/>
+        <a:font script="Cher" typeface="Plantagenet Cherokee"/>
+        <a:font script="Yiii" typeface="Microsoft Yi Baiti"/>
+        <a:font script="Tibt" typeface="Microsoft Himalaya"/>
+        <a:font script="Thaa" typeface="MV Boli"/>
+        <a:font script="Deva" typeface="Mangal"/>
+        <a:font script="Telu" typeface="Gautami"/>
+        <a:font script="Taml" typeface="Latha"/>
+        <a:font script="Syrc" typeface="Estrangelo Edessa"/>
+        <a:font script="Orya" typeface="Kalinga"/>
+        <a:font script="Mlym" typeface="Kartika"/>
+        <a:font script="Laoo" typeface="DokChampa"/>
+        <a:font script="Sinh" typeface="Iskoola Pota"/>
+        <a:font script="Mong" typeface="Mongolian Baiti"/>
+        <a:font script="Viet" typeface="Arial"/>
+        <a:font script="Uigh" typeface="Microsoft Uighur"/>
+        <a:font script="Geor" typeface="Sylfaen"/>
       </a:minorFont>
     </a:fontScheme>
     <a:fmtScheme name="Office">
@@ -1425,67 +1485,15 @@
         <a:srgbClr val="954F72"/>
       </a:folHlink>
     </a:clrScheme>
-    <a:fontScheme name="Office">
+    <a:fontScheme name="Arial">
       <a:majorFont>
-        <a:latin typeface="Calibri Light" panose="020F0302020204030204"/>
+        <a:latin typeface="Arial" panose="020B0604020202020204"/>
         <a:ea typeface=""/>
         <a:cs typeface=""/>
-        <a:font script="Jpan" typeface="游ゴシック Light"/>
-        <a:font script="Hang" typeface="맑은 고딕"/>
-        <a:font script="Hans" typeface="等线 Light"/>
-        <a:font script="Hant" typeface="新細明體"/>
-        <a:font script="Arab" typeface="Times New Roman"/>
-        <a:font script="Hebr" typeface="Times New Roman"/>
-        <a:font script="Thai" typeface="Angsana New"/>
-        <a:font script="Ethi" typeface="Nyala"/>
-        <a:font script="Beng" typeface="Vrinda"/>
-        <a:font script="Gujr" typeface="Shruti"/>
-        <a:font script="Khmr" typeface="MoolBoran"/>
-        <a:font script="Knda" typeface="Tunga"/>
-        <a:font script="Guru" typeface="Raavi"/>
-        <a:font script="Cans" typeface="Euphemia"/>
-        <a:font script="Cher" typeface="Plantagenet Cherokee"/>
-        <a:font script="Yiii" typeface="Microsoft Yi Baiti"/>
-        <a:font script="Tibt" typeface="Microsoft Himalaya"/>
-        <a:font script="Thaa" typeface="MV Boli"/>
-        <a:font script="Deva" typeface="Mangal"/>
-        <a:font script="Telu" typeface="Gautami"/>
-        <a:font script="Taml" typeface="Latha"/>
-        <a:font script="Syrc" typeface="Estrangelo Edessa"/>
-        <a:font script="Orya" typeface="Kalinga"/>
-        <a:font script="Mlym" typeface="Kartika"/>
-        <a:font script="Laoo" typeface="DokChampa"/>
-        <a:font script="Sinh" typeface="Iskoola Pota"/>
-        <a:font script="Mong" typeface="Mongolian Baiti"/>
-        <a:font script="Viet" typeface="Times New Roman"/>
-        <a:font script="Uigh" typeface="Microsoft Uighur"/>
-        <a:font script="Geor" typeface="Sylfaen"/>
-        <a:font script="Armn" typeface="Arial"/>
-        <a:font script="Bugi" typeface="Leelawadee UI"/>
-        <a:font script="Bopo" typeface="Microsoft JhengHei"/>
-        <a:font script="Java" typeface="Javanese Text"/>
-        <a:font script="Lisu" typeface="Segoe UI"/>
-        <a:font script="Mymr" typeface="Myanmar Text"/>
-        <a:font script="Nkoo" typeface="Ebrima"/>
-        <a:font script="Olck" typeface="Nirmala UI"/>
-        <a:font script="Osma" typeface="Ebrima"/>
-        <a:font script="Phag" typeface="Phagspa"/>
-        <a:font script="Syrn" typeface="Estrangelo Edessa"/>
-        <a:font script="Syrj" typeface="Estrangelo Edessa"/>
-        <a:font script="Syre" typeface="Estrangelo Edessa"/>
-        <a:font script="Sora" typeface="Nirmala UI"/>
-        <a:font script="Tale" typeface="Microsoft Tai Le"/>
-        <a:font script="Talu" typeface="Microsoft New Tai Lue"/>
-        <a:font script="Tfng" typeface="Ebrima"/>
-      </a:majorFont>
-      <a:minorFont>
-        <a:latin typeface="Calibri" panose="020F0502020204030204"/>
-        <a:ea typeface=""/>
-        <a:cs typeface=""/>
-        <a:font script="Jpan" typeface="游ゴシック"/>
-        <a:font script="Hang" typeface="맑은 고딕"/>
-        <a:font script="Hans" typeface="等线"/>
-        <a:font script="Hant" typeface="新細明體"/>
+        <a:font script="Jpan" typeface="ＭＳ Ｐゴシック"/>
+        <a:font script="Hang" typeface="굴림"/>
+        <a:font script="Hans" typeface="黑体"/>
+        <a:font script="Hant" typeface="微軟正黑體"/>
         <a:font script="Arab" typeface="Arial"/>
         <a:font script="Hebr" typeface="Arial"/>
         <a:font script="Thai" typeface="Cordia New"/>
@@ -1512,23 +1520,41 @@
         <a:font script="Viet" typeface="Arial"/>
         <a:font script="Uigh" typeface="Microsoft Uighur"/>
         <a:font script="Geor" typeface="Sylfaen"/>
-        <a:font script="Armn" typeface="Arial"/>
-        <a:font script="Bugi" typeface="Leelawadee UI"/>
-        <a:font script="Bopo" typeface="Microsoft JhengHei"/>
-        <a:font script="Java" typeface="Javanese Text"/>
-        <a:font script="Lisu" typeface="Segoe UI"/>
-        <a:font script="Mymr" typeface="Myanmar Text"/>
-        <a:font script="Nkoo" typeface="Ebrima"/>
-        <a:font script="Olck" typeface="Nirmala UI"/>
-        <a:font script="Osma" typeface="Ebrima"/>
-        <a:font script="Phag" typeface="Phagspa"/>
-        <a:font script="Syrn" typeface="Estrangelo Edessa"/>
-        <a:font script="Syrj" typeface="Estrangelo Edessa"/>
-        <a:font script="Syre" typeface="Estrangelo Edessa"/>
-        <a:font script="Sora" typeface="Nirmala UI"/>
-        <a:font script="Tale" typeface="Microsoft Tai Le"/>
-        <a:font script="Talu" typeface="Microsoft New Tai Lue"/>
-        <a:font script="Tfng" typeface="Ebrima"/>
+      </a:majorFont>
+      <a:minorFont>
+        <a:latin typeface="Arial" panose="020B0604020202020204"/>
+        <a:ea typeface=""/>
+        <a:cs typeface=""/>
+        <a:font script="Jpan" typeface="ＭＳ Ｐゴシック"/>
+        <a:font script="Hang" typeface="굴림"/>
+        <a:font script="Hans" typeface="黑体"/>
+        <a:font script="Hant" typeface="微軟正黑體"/>
+        <a:font script="Arab" typeface="Arial"/>
+        <a:font script="Hebr" typeface="Arial"/>
+        <a:font script="Thai" typeface="Cordia New"/>
+        <a:font script="Ethi" typeface="Nyala"/>
+        <a:font script="Beng" typeface="Vrinda"/>
+        <a:font script="Gujr" typeface="Shruti"/>
+        <a:font script="Khmr" typeface="DaunPenh"/>
+        <a:font script="Knda" typeface="Tunga"/>
+        <a:font script="Guru" typeface="Raavi"/>
+        <a:font script="Cans" typeface="Euphemia"/>
+        <a:font script="Cher" typeface="Plantagenet Cherokee"/>
+        <a:font script="Yiii" typeface="Microsoft Yi Baiti"/>
+        <a:font script="Tibt" typeface="Microsoft Himalaya"/>
+        <a:font script="Thaa" typeface="MV Boli"/>
+        <a:font script="Deva" typeface="Mangal"/>
+        <a:font script="Telu" typeface="Gautami"/>
+        <a:font script="Taml" typeface="Latha"/>
+        <a:font script="Syrc" typeface="Estrangelo Edessa"/>
+        <a:font script="Orya" typeface="Kalinga"/>
+        <a:font script="Mlym" typeface="Kartika"/>
+        <a:font script="Laoo" typeface="DokChampa"/>
+        <a:font script="Sinh" typeface="Iskoola Pota"/>
+        <a:font script="Mong" typeface="Mongolian Baiti"/>
+        <a:font script="Viet" typeface="Arial"/>
+        <a:font script="Uigh" typeface="Microsoft Uighur"/>
+        <a:font script="Geor" typeface="Sylfaen"/>
       </a:minorFont>
     </a:fontScheme>
     <a:fmtScheme name="Office">

</xml_diff>

<commit_message>
replace all instances of Bookerly font with Times New Roman to be cross plat compatible
</commit_message>
<xml_diff>
--- a/src/manuscript2slides/resources/pptx_template.pptx
+++ b/src/manuscript2slides/resources/pptx_template.pptx
@@ -465,7 +465,7 @@
 </file>
 
 <file path=ppt/slideLayouts/slideLayout1.xml><?xml version="1.0" encoding="utf-8"?>
-<p:sldLayout xmlns:a="http://schemas.openxmlformats.org/drawingml/2006/main" xmlns:r="http://schemas.openxmlformats.org/officeDocument/2006/relationships" xmlns:p="http://schemas.openxmlformats.org/presentationml/2006/main" preserve="1" userDrawn="1">
+<p:sldLayout xmlns:a="http://schemas.openxmlformats.org/drawingml/2006/main" xmlns:ns2="http://schemas.microsoft.com/office/drawing/2014/main" xmlns:ns3="http://schemas.microsoft.com/office/powerpoint/2010/main" xmlns:p="http://schemas.openxmlformats.org/presentationml/2006/main" preserve="1" userDrawn="1">
   <p:cSld name="manuscript2slides">
     <p:spTree>
       <p:nvGrpSpPr>
@@ -486,7 +486,7 @@
           <p:cNvPr id="3" name="Date Placeholder 2">
             <a:extLst>
               <a:ext uri="{FF2B5EF4-FFF2-40B4-BE49-F238E27FC236}">
-                <a16:creationId xmlns:a16="http://schemas.microsoft.com/office/drawing/2014/main" id="{8000513D-E995-1B16-AB26-1B43B826593E}"/>
+                <ns2:creationId id="{8000513D-E995-1B16-AB26-1B43B826593E}"/>
               </a:ext>
             </a:extLst>
           </p:cNvPr>
@@ -515,7 +515,7 @@
           <p:cNvPr id="4" name="Footer Placeholder 3">
             <a:extLst>
               <a:ext uri="{FF2B5EF4-FFF2-40B4-BE49-F238E27FC236}">
-                <a16:creationId xmlns:a16="http://schemas.microsoft.com/office/drawing/2014/main" id="{CD19D53E-B87C-FF06-8D45-A5FA5C879B99}"/>
+                <ns2:creationId id="{CD19D53E-B87C-FF06-8D45-A5FA5C879B99}"/>
               </a:ext>
             </a:extLst>
           </p:cNvPr>
@@ -540,7 +540,7 @@
           <p:cNvPr id="5" name="Slide Number Placeholder 4">
             <a:extLst>
               <a:ext uri="{FF2B5EF4-FFF2-40B4-BE49-F238E27FC236}">
-                <a16:creationId xmlns:a16="http://schemas.microsoft.com/office/drawing/2014/main" id="{629E4ABB-0E14-9DCA-53D9-B57B49DA3085}"/>
+                <ns2:creationId id="{629E4ABB-0E14-9DCA-53D9-B57B49DA3085}"/>
               </a:ext>
             </a:extLst>
           </p:cNvPr>
@@ -569,7 +569,7 @@
           <p:cNvPr id="6" name="Content Placeholder 2">
             <a:extLst>
               <a:ext uri="{FF2B5EF4-FFF2-40B4-BE49-F238E27FC236}">
-                <a16:creationId xmlns:a16="http://schemas.microsoft.com/office/drawing/2014/main" id="{25E7AE76-1742-3895-C2A2-0B99FED22B46}"/>
+                <ns2:creationId id="{25E7AE76-1742-3895-C2A2-0B99FED22B46}"/>
               </a:ext>
             </a:extLst>
           </p:cNvPr>
@@ -598,8 +598,8 @@
               <a:buNone/>
               <a:defRPr sz="1800">
                 <a:latin typeface="+mj-lt"/>
-                <a:ea typeface="Bookerly" panose="02020602040305020204" pitchFamily="18" charset="0"/>
-                <a:cs typeface="Bookerly" panose="02020602040305020204" pitchFamily="18" charset="0"/>
+                <a:ea typeface="Times New Roman" panose="02020602040305020204" pitchFamily="18" charset="0"/>
+                <a:cs typeface="Times New Roman" panose="02020602040305020204" pitchFamily="18" charset="0"/>
               </a:defRPr>
             </a:lvl1pPr>
           </a:lstStyle>
@@ -615,7 +615,7 @@
     </p:spTree>
     <p:extLst>
       <p:ext uri="{BB962C8B-B14F-4D97-AF65-F5344CB8AC3E}">
-        <p14:creationId xmlns:p14="http://schemas.microsoft.com/office/powerpoint/2010/main" val="4085609035"/>
+        <ns3:creationId val="4085609035"/>
       </p:ext>
     </p:extLst>
   </p:cSld>

</xml_diff>